<commit_message>
worked on special project poster formatting code. decided to output pptx instead of pdf, for easier last minute changes and re-lengthing.
</commit_message>
<xml_diff>
--- a/code/template_landscape.pptx
+++ b/code/template_landscape.pptx
@@ -2,12 +2,12 @@
 <file path=ppt/presentation.xml><?xml version="1.0" encoding="utf-8"?>
 <p:presentation xmlns:a="http://schemas.openxmlformats.org/drawingml/2006/main" xmlns:r="http://schemas.openxmlformats.org/officeDocument/2006/relationships" xmlns:p="http://schemas.openxmlformats.org/presentationml/2006/main" saveSubsetFonts="1">
   <p:sldMasterIdLst>
-    <p:sldMasterId id="2147483684" r:id="rId1"/>
+    <p:sldMasterId id="2147483696" r:id="rId1"/>
   </p:sldMasterIdLst>
   <p:sldIdLst>
     <p:sldId id="256" r:id="rId2"/>
   </p:sldIdLst>
-  <p:sldSz cx="43891200" cy="32918400"/>
+  <p:sldSz cx="43891200" cy="43891200"/>
   <p:notesSz cx="6858000" cy="9144000"/>
   <p:defaultTextStyle>
     <a:defPPr>
@@ -107,7 +107,7 @@
   <p:extLst>
     <p:ext uri="{EFAFB233-063F-42B5-8137-9DF3F51BA10A}">
       <p15:sldGuideLst xmlns:p15="http://schemas.microsoft.com/office/powerpoint/2012/main">
-        <p15:guide id="1" orient="horz" pos="10368" userDrawn="1">
+        <p15:guide id="1" orient="horz" pos="13824" userDrawn="1">
           <p15:clr>
             <a:srgbClr val="A4A3A4"/>
           </p15:clr>
@@ -152,8 +152,8 @@
         </p:nvSpPr>
         <p:spPr>
           <a:xfrm>
-            <a:off x="3291840" y="5387342"/>
-            <a:ext cx="37307520" cy="11460480"/>
+            <a:off x="3291840" y="7183123"/>
+            <a:ext cx="37307520" cy="15280640"/>
           </a:xfrm>
         </p:spPr>
         <p:txBody>
@@ -184,8 +184,8 @@
         </p:nvSpPr>
         <p:spPr>
           <a:xfrm>
-            <a:off x="5486400" y="17289782"/>
-            <a:ext cx="32918400" cy="7947658"/>
+            <a:off x="5486400" y="23053043"/>
+            <a:ext cx="32918400" cy="10596877"/>
           </a:xfrm>
         </p:spPr>
         <p:txBody>
@@ -254,7 +254,7 @@
           <a:p>
             <a:fld id="{A7146EFB-3959-4CE9-B210-335163EB0542}" type="datetimeFigureOut">
               <a:rPr lang="en-US" smtClean="0"/>
-              <a:t>4/16/2022</a:t>
+              <a:t>4/1/2023</a:t>
             </a:fld>
             <a:endParaRPr lang="en-US"/>
           </a:p>
@@ -305,7 +305,7 @@
     </p:spTree>
     <p:extLst>
       <p:ext uri="{BB962C8B-B14F-4D97-AF65-F5344CB8AC3E}">
-        <p14:creationId xmlns:p14="http://schemas.microsoft.com/office/powerpoint/2010/main" val="4096307259"/>
+        <p14:creationId xmlns:p14="http://schemas.microsoft.com/office/powerpoint/2010/main" val="563405703"/>
       </p:ext>
     </p:extLst>
   </p:cSld>
@@ -373,7 +373,7 @@
             <a:pPr lvl="0"/>
             <a:r>
               <a:rPr lang="en-US"/>
-              <a:t>Click to edit Master text styles</a:t>
+              <a:t>Edit Master text styles</a:t>
             </a:r>
           </a:p>
           <a:p>
@@ -424,7 +424,7 @@
           <a:p>
             <a:fld id="{A7146EFB-3959-4CE9-B210-335163EB0542}" type="datetimeFigureOut">
               <a:rPr lang="en-US" smtClean="0"/>
-              <a:t>4/16/2022</a:t>
+              <a:t>4/1/2023</a:t>
             </a:fld>
             <a:endParaRPr lang="en-US"/>
           </a:p>
@@ -475,7 +475,7 @@
     </p:spTree>
     <p:extLst>
       <p:ext uri="{BB962C8B-B14F-4D97-AF65-F5344CB8AC3E}">
-        <p14:creationId xmlns:p14="http://schemas.microsoft.com/office/powerpoint/2010/main" val="1605394987"/>
+        <p14:creationId xmlns:p14="http://schemas.microsoft.com/office/powerpoint/2010/main" val="4161473797"/>
       </p:ext>
     </p:extLst>
   </p:cSld>
@@ -514,8 +514,8 @@
         </p:nvSpPr>
         <p:spPr>
           <a:xfrm>
-            <a:off x="31409642" y="1752600"/>
-            <a:ext cx="9464040" cy="27896822"/>
+            <a:off x="31409642" y="2336800"/>
+            <a:ext cx="9464040" cy="37195763"/>
           </a:xfrm>
         </p:spPr>
         <p:txBody>
@@ -542,8 +542,8 @@
         </p:nvSpPr>
         <p:spPr>
           <a:xfrm>
-            <a:off x="3017522" y="1752600"/>
-            <a:ext cx="27843480" cy="27896822"/>
+            <a:off x="3017522" y="2336800"/>
+            <a:ext cx="27843480" cy="37195763"/>
           </a:xfrm>
         </p:spPr>
         <p:txBody>
@@ -553,7 +553,7 @@
             <a:pPr lvl="0"/>
             <a:r>
               <a:rPr lang="en-US"/>
-              <a:t>Click to edit Master text styles</a:t>
+              <a:t>Edit Master text styles</a:t>
             </a:r>
           </a:p>
           <a:p>
@@ -604,7 +604,7 @@
           <a:p>
             <a:fld id="{A7146EFB-3959-4CE9-B210-335163EB0542}" type="datetimeFigureOut">
               <a:rPr lang="en-US" smtClean="0"/>
-              <a:t>4/16/2022</a:t>
+              <a:t>4/1/2023</a:t>
             </a:fld>
             <a:endParaRPr lang="en-US"/>
           </a:p>
@@ -655,7 +655,7 @@
     </p:spTree>
     <p:extLst>
       <p:ext uri="{BB962C8B-B14F-4D97-AF65-F5344CB8AC3E}">
-        <p14:creationId xmlns:p14="http://schemas.microsoft.com/office/powerpoint/2010/main" val="3470080989"/>
+        <p14:creationId xmlns:p14="http://schemas.microsoft.com/office/powerpoint/2010/main" val="1688398348"/>
       </p:ext>
     </p:extLst>
   </p:cSld>
@@ -723,7 +723,7 @@
             <a:pPr lvl="0"/>
             <a:r>
               <a:rPr lang="en-US"/>
-              <a:t>Click to edit Master text styles</a:t>
+              <a:t>Edit Master text styles</a:t>
             </a:r>
           </a:p>
           <a:p>
@@ -774,7 +774,7 @@
           <a:p>
             <a:fld id="{A7146EFB-3959-4CE9-B210-335163EB0542}" type="datetimeFigureOut">
               <a:rPr lang="en-US" smtClean="0"/>
-              <a:t>4/16/2022</a:t>
+              <a:t>4/1/2023</a:t>
             </a:fld>
             <a:endParaRPr lang="en-US"/>
           </a:p>
@@ -825,7 +825,7 @@
     </p:spTree>
     <p:extLst>
       <p:ext uri="{BB962C8B-B14F-4D97-AF65-F5344CB8AC3E}">
-        <p14:creationId xmlns:p14="http://schemas.microsoft.com/office/powerpoint/2010/main" val="1085242197"/>
+        <p14:creationId xmlns:p14="http://schemas.microsoft.com/office/powerpoint/2010/main" val="2213424283"/>
       </p:ext>
     </p:extLst>
   </p:cSld>
@@ -864,8 +864,8 @@
         </p:nvSpPr>
         <p:spPr>
           <a:xfrm>
-            <a:off x="2994662" y="8206749"/>
-            <a:ext cx="37856160" cy="13693138"/>
+            <a:off x="2994662" y="10942333"/>
+            <a:ext cx="37856160" cy="18257517"/>
           </a:xfrm>
         </p:spPr>
         <p:txBody>
@@ -896,8 +896,8 @@
         </p:nvSpPr>
         <p:spPr>
           <a:xfrm>
-            <a:off x="2994662" y="22029429"/>
-            <a:ext cx="37856160" cy="7200898"/>
+            <a:off x="2994662" y="29372573"/>
+            <a:ext cx="37856160" cy="9601197"/>
           </a:xfrm>
         </p:spPr>
         <p:txBody>
@@ -996,7 +996,7 @@
             <a:pPr lvl="0"/>
             <a:r>
               <a:rPr lang="en-US"/>
-              <a:t>Click to edit Master text styles</a:t>
+              <a:t>Edit Master text styles</a:t>
             </a:r>
           </a:p>
         </p:txBody>
@@ -1018,7 +1018,7 @@
           <a:p>
             <a:fld id="{A7146EFB-3959-4CE9-B210-335163EB0542}" type="datetimeFigureOut">
               <a:rPr lang="en-US" smtClean="0"/>
-              <a:t>4/16/2022</a:t>
+              <a:t>4/1/2023</a:t>
             </a:fld>
             <a:endParaRPr lang="en-US"/>
           </a:p>
@@ -1069,7 +1069,7 @@
     </p:spTree>
     <p:extLst>
       <p:ext uri="{BB962C8B-B14F-4D97-AF65-F5344CB8AC3E}">
-        <p14:creationId xmlns:p14="http://schemas.microsoft.com/office/powerpoint/2010/main" val="1621300176"/>
+        <p14:creationId xmlns:p14="http://schemas.microsoft.com/office/powerpoint/2010/main" val="4089248092"/>
       </p:ext>
     </p:extLst>
   </p:cSld>
@@ -1131,8 +1131,8 @@
         </p:nvSpPr>
         <p:spPr>
           <a:xfrm>
-            <a:off x="3017520" y="8763000"/>
-            <a:ext cx="18653760" cy="20886422"/>
+            <a:off x="3017520" y="11684000"/>
+            <a:ext cx="18653760" cy="27848563"/>
           </a:xfrm>
         </p:spPr>
         <p:txBody>
@@ -1142,7 +1142,7 @@
             <a:pPr lvl="0"/>
             <a:r>
               <a:rPr lang="en-US"/>
-              <a:t>Click to edit Master text styles</a:t>
+              <a:t>Edit Master text styles</a:t>
             </a:r>
           </a:p>
           <a:p>
@@ -1188,8 +1188,8 @@
         </p:nvSpPr>
         <p:spPr>
           <a:xfrm>
-            <a:off x="22219920" y="8763000"/>
-            <a:ext cx="18653760" cy="20886422"/>
+            <a:off x="22219920" y="11684000"/>
+            <a:ext cx="18653760" cy="27848563"/>
           </a:xfrm>
         </p:spPr>
         <p:txBody>
@@ -1199,7 +1199,7 @@
             <a:pPr lvl="0"/>
             <a:r>
               <a:rPr lang="en-US"/>
-              <a:t>Click to edit Master text styles</a:t>
+              <a:t>Edit Master text styles</a:t>
             </a:r>
           </a:p>
           <a:p>
@@ -1250,7 +1250,7 @@
           <a:p>
             <a:fld id="{A7146EFB-3959-4CE9-B210-335163EB0542}" type="datetimeFigureOut">
               <a:rPr lang="en-US" smtClean="0"/>
-              <a:t>4/16/2022</a:t>
+              <a:t>4/1/2023</a:t>
             </a:fld>
             <a:endParaRPr lang="en-US"/>
           </a:p>
@@ -1301,7 +1301,7 @@
     </p:spTree>
     <p:extLst>
       <p:ext uri="{BB962C8B-B14F-4D97-AF65-F5344CB8AC3E}">
-        <p14:creationId xmlns:p14="http://schemas.microsoft.com/office/powerpoint/2010/main" val="2307477245"/>
+        <p14:creationId xmlns:p14="http://schemas.microsoft.com/office/powerpoint/2010/main" val="630700763"/>
       </p:ext>
     </p:extLst>
   </p:cSld>
@@ -1340,8 +1340,8 @@
         </p:nvSpPr>
         <p:spPr>
           <a:xfrm>
-            <a:off x="3023237" y="1752607"/>
-            <a:ext cx="37856160" cy="6362702"/>
+            <a:off x="3023237" y="2336810"/>
+            <a:ext cx="37856160" cy="8483603"/>
           </a:xfrm>
         </p:spPr>
         <p:txBody>
@@ -1368,8 +1368,8 @@
         </p:nvSpPr>
         <p:spPr>
           <a:xfrm>
-            <a:off x="3023242" y="8069582"/>
-            <a:ext cx="18568032" cy="3954778"/>
+            <a:off x="3023242" y="10759443"/>
+            <a:ext cx="18568032" cy="5273037"/>
           </a:xfrm>
         </p:spPr>
         <p:txBody>
@@ -1416,7 +1416,7 @@
             <a:pPr lvl="0"/>
             <a:r>
               <a:rPr lang="en-US"/>
-              <a:t>Click to edit Master text styles</a:t>
+              <a:t>Edit Master text styles</a:t>
             </a:r>
           </a:p>
         </p:txBody>
@@ -1433,8 +1433,8 @@
         </p:nvSpPr>
         <p:spPr>
           <a:xfrm>
-            <a:off x="3023242" y="12024360"/>
-            <a:ext cx="18568032" cy="17686022"/>
+            <a:off x="3023242" y="16032480"/>
+            <a:ext cx="18568032" cy="23581363"/>
           </a:xfrm>
         </p:spPr>
         <p:txBody>
@@ -1444,7 +1444,7 @@
             <a:pPr lvl="0"/>
             <a:r>
               <a:rPr lang="en-US"/>
-              <a:t>Click to edit Master text styles</a:t>
+              <a:t>Edit Master text styles</a:t>
             </a:r>
           </a:p>
           <a:p>
@@ -1490,8 +1490,8 @@
         </p:nvSpPr>
         <p:spPr>
           <a:xfrm>
-            <a:off x="22219922" y="8069582"/>
-            <a:ext cx="18659477" cy="3954778"/>
+            <a:off x="22219922" y="10759443"/>
+            <a:ext cx="18659477" cy="5273037"/>
           </a:xfrm>
         </p:spPr>
         <p:txBody>
@@ -1538,7 +1538,7 @@
             <a:pPr lvl="0"/>
             <a:r>
               <a:rPr lang="en-US"/>
-              <a:t>Click to edit Master text styles</a:t>
+              <a:t>Edit Master text styles</a:t>
             </a:r>
           </a:p>
         </p:txBody>
@@ -1555,8 +1555,8 @@
         </p:nvSpPr>
         <p:spPr>
           <a:xfrm>
-            <a:off x="22219922" y="12024360"/>
-            <a:ext cx="18659477" cy="17686022"/>
+            <a:off x="22219922" y="16032480"/>
+            <a:ext cx="18659477" cy="23581363"/>
           </a:xfrm>
         </p:spPr>
         <p:txBody>
@@ -1566,7 +1566,7 @@
             <a:pPr lvl="0"/>
             <a:r>
               <a:rPr lang="en-US"/>
-              <a:t>Click to edit Master text styles</a:t>
+              <a:t>Edit Master text styles</a:t>
             </a:r>
           </a:p>
           <a:p>
@@ -1617,7 +1617,7 @@
           <a:p>
             <a:fld id="{A7146EFB-3959-4CE9-B210-335163EB0542}" type="datetimeFigureOut">
               <a:rPr lang="en-US" smtClean="0"/>
-              <a:t>4/16/2022</a:t>
+              <a:t>4/1/2023</a:t>
             </a:fld>
             <a:endParaRPr lang="en-US"/>
           </a:p>
@@ -1668,7 +1668,7 @@
     </p:spTree>
     <p:extLst>
       <p:ext uri="{BB962C8B-B14F-4D97-AF65-F5344CB8AC3E}">
-        <p14:creationId xmlns:p14="http://schemas.microsoft.com/office/powerpoint/2010/main" val="3512387301"/>
+        <p14:creationId xmlns:p14="http://schemas.microsoft.com/office/powerpoint/2010/main" val="3774574505"/>
       </p:ext>
     </p:extLst>
   </p:cSld>
@@ -1735,7 +1735,7 @@
           <a:p>
             <a:fld id="{A7146EFB-3959-4CE9-B210-335163EB0542}" type="datetimeFigureOut">
               <a:rPr lang="en-US" smtClean="0"/>
-              <a:t>4/16/2022</a:t>
+              <a:t>4/1/2023</a:t>
             </a:fld>
             <a:endParaRPr lang="en-US"/>
           </a:p>
@@ -1786,7 +1786,7 @@
     </p:spTree>
     <p:extLst>
       <p:ext uri="{BB962C8B-B14F-4D97-AF65-F5344CB8AC3E}">
-        <p14:creationId xmlns:p14="http://schemas.microsoft.com/office/powerpoint/2010/main" val="3953530884"/>
+        <p14:creationId xmlns:p14="http://schemas.microsoft.com/office/powerpoint/2010/main" val="2542565760"/>
       </p:ext>
     </p:extLst>
   </p:cSld>
@@ -1830,7 +1830,7 @@
           <a:p>
             <a:fld id="{A7146EFB-3959-4CE9-B210-335163EB0542}" type="datetimeFigureOut">
               <a:rPr lang="en-US" smtClean="0"/>
-              <a:t>4/16/2022</a:t>
+              <a:t>4/1/2023</a:t>
             </a:fld>
             <a:endParaRPr lang="en-US"/>
           </a:p>
@@ -1881,7 +1881,7 @@
     </p:spTree>
     <p:extLst>
       <p:ext uri="{BB962C8B-B14F-4D97-AF65-F5344CB8AC3E}">
-        <p14:creationId xmlns:p14="http://schemas.microsoft.com/office/powerpoint/2010/main" val="1398347243"/>
+        <p14:creationId xmlns:p14="http://schemas.microsoft.com/office/powerpoint/2010/main" val="3359046726"/>
       </p:ext>
     </p:extLst>
   </p:cSld>
@@ -1920,8 +1920,8 @@
         </p:nvSpPr>
         <p:spPr>
           <a:xfrm>
-            <a:off x="3023237" y="2194560"/>
-            <a:ext cx="14156054" cy="7680960"/>
+            <a:off x="3023237" y="2926080"/>
+            <a:ext cx="14156054" cy="10241280"/>
           </a:xfrm>
         </p:spPr>
         <p:txBody>
@@ -1952,8 +1952,8 @@
         </p:nvSpPr>
         <p:spPr>
           <a:xfrm>
-            <a:off x="18659477" y="4739647"/>
-            <a:ext cx="22219920" cy="23393400"/>
+            <a:off x="18659477" y="6319530"/>
+            <a:ext cx="22219920" cy="31191200"/>
           </a:xfrm>
         </p:spPr>
         <p:txBody>
@@ -1991,7 +1991,7 @@
             <a:pPr lvl="0"/>
             <a:r>
               <a:rPr lang="en-US"/>
-              <a:t>Click to edit Master text styles</a:t>
+              <a:t>Edit Master text styles</a:t>
             </a:r>
           </a:p>
           <a:p>
@@ -2037,8 +2037,8 @@
         </p:nvSpPr>
         <p:spPr>
           <a:xfrm>
-            <a:off x="3023237" y="9875520"/>
-            <a:ext cx="14156054" cy="18295622"/>
+            <a:off x="3023237" y="13167360"/>
+            <a:ext cx="14156054" cy="24394163"/>
           </a:xfrm>
         </p:spPr>
         <p:txBody>
@@ -2085,7 +2085,7 @@
             <a:pPr lvl="0"/>
             <a:r>
               <a:rPr lang="en-US"/>
-              <a:t>Click to edit Master text styles</a:t>
+              <a:t>Edit Master text styles</a:t>
             </a:r>
           </a:p>
         </p:txBody>
@@ -2107,7 +2107,7 @@
           <a:p>
             <a:fld id="{A7146EFB-3959-4CE9-B210-335163EB0542}" type="datetimeFigureOut">
               <a:rPr lang="en-US" smtClean="0"/>
-              <a:t>4/16/2022</a:t>
+              <a:t>4/1/2023</a:t>
             </a:fld>
             <a:endParaRPr lang="en-US"/>
           </a:p>
@@ -2158,7 +2158,7 @@
     </p:spTree>
     <p:extLst>
       <p:ext uri="{BB962C8B-B14F-4D97-AF65-F5344CB8AC3E}">
-        <p14:creationId xmlns:p14="http://schemas.microsoft.com/office/powerpoint/2010/main" val="2711689153"/>
+        <p14:creationId xmlns:p14="http://schemas.microsoft.com/office/powerpoint/2010/main" val="2980171071"/>
       </p:ext>
     </p:extLst>
   </p:cSld>
@@ -2197,8 +2197,8 @@
         </p:nvSpPr>
         <p:spPr>
           <a:xfrm>
-            <a:off x="3023237" y="2194560"/>
-            <a:ext cx="14156054" cy="7680960"/>
+            <a:off x="3023237" y="2926080"/>
+            <a:ext cx="14156054" cy="10241280"/>
           </a:xfrm>
         </p:spPr>
         <p:txBody>
@@ -2229,8 +2229,8 @@
         </p:nvSpPr>
         <p:spPr>
           <a:xfrm>
-            <a:off x="18659477" y="4739647"/>
-            <a:ext cx="22219920" cy="23393400"/>
+            <a:off x="18659477" y="6319530"/>
+            <a:ext cx="22219920" cy="31191200"/>
           </a:xfrm>
         </p:spPr>
         <p:txBody>
@@ -2294,8 +2294,8 @@
         </p:nvSpPr>
         <p:spPr>
           <a:xfrm>
-            <a:off x="3023237" y="9875520"/>
-            <a:ext cx="14156054" cy="18295622"/>
+            <a:off x="3023237" y="13167360"/>
+            <a:ext cx="14156054" cy="24394163"/>
           </a:xfrm>
         </p:spPr>
         <p:txBody>
@@ -2342,7 +2342,7 @@
             <a:pPr lvl="0"/>
             <a:r>
               <a:rPr lang="en-US"/>
-              <a:t>Click to edit Master text styles</a:t>
+              <a:t>Edit Master text styles</a:t>
             </a:r>
           </a:p>
         </p:txBody>
@@ -2364,7 +2364,7 @@
           <a:p>
             <a:fld id="{A7146EFB-3959-4CE9-B210-335163EB0542}" type="datetimeFigureOut">
               <a:rPr lang="en-US" smtClean="0"/>
-              <a:t>4/16/2022</a:t>
+              <a:t>4/1/2023</a:t>
             </a:fld>
             <a:endParaRPr lang="en-US"/>
           </a:p>
@@ -2415,7 +2415,7 @@
     </p:spTree>
     <p:extLst>
       <p:ext uri="{BB962C8B-B14F-4D97-AF65-F5344CB8AC3E}">
-        <p14:creationId xmlns:p14="http://schemas.microsoft.com/office/powerpoint/2010/main" val="2888491901"/>
+        <p14:creationId xmlns:p14="http://schemas.microsoft.com/office/powerpoint/2010/main" val="368447483"/>
       </p:ext>
     </p:extLst>
   </p:cSld>
@@ -2459,8 +2459,8 @@
         </p:nvSpPr>
         <p:spPr>
           <a:xfrm>
-            <a:off x="3017520" y="1752607"/>
-            <a:ext cx="37856160" cy="6362702"/>
+            <a:off x="3017520" y="2336810"/>
+            <a:ext cx="37856160" cy="8483603"/>
           </a:xfrm>
           <a:prstGeom prst="rect">
             <a:avLst/>
@@ -2492,8 +2492,8 @@
         </p:nvSpPr>
         <p:spPr>
           <a:xfrm>
-            <a:off x="3017520" y="8763000"/>
-            <a:ext cx="37856160" cy="20886422"/>
+            <a:off x="3017520" y="11684000"/>
+            <a:ext cx="37856160" cy="27848563"/>
           </a:xfrm>
           <a:prstGeom prst="rect">
             <a:avLst/>
@@ -2508,7 +2508,7 @@
             <a:pPr lvl="0"/>
             <a:r>
               <a:rPr lang="en-US"/>
-              <a:t>Click to edit Master text styles</a:t>
+              <a:t>Edit Master text styles</a:t>
             </a:r>
           </a:p>
           <a:p>
@@ -2554,8 +2554,8 @@
         </p:nvSpPr>
         <p:spPr>
           <a:xfrm>
-            <a:off x="3017520" y="30510487"/>
-            <a:ext cx="9875520" cy="1752600"/>
+            <a:off x="3017520" y="40680650"/>
+            <a:ext cx="9875520" cy="2336800"/>
           </a:xfrm>
           <a:prstGeom prst="rect">
             <a:avLst/>
@@ -2577,7 +2577,7 @@
           <a:p>
             <a:fld id="{A7146EFB-3959-4CE9-B210-335163EB0542}" type="datetimeFigureOut">
               <a:rPr lang="en-US" smtClean="0"/>
-              <a:t>4/16/2022</a:t>
+              <a:t>4/1/2023</a:t>
             </a:fld>
             <a:endParaRPr lang="en-US"/>
           </a:p>
@@ -2595,8 +2595,8 @@
         </p:nvSpPr>
         <p:spPr>
           <a:xfrm>
-            <a:off x="14538960" y="30510487"/>
-            <a:ext cx="14813280" cy="1752600"/>
+            <a:off x="14538960" y="40680650"/>
+            <a:ext cx="14813280" cy="2336800"/>
           </a:xfrm>
           <a:prstGeom prst="rect">
             <a:avLst/>
@@ -2632,8 +2632,8 @@
         </p:nvSpPr>
         <p:spPr>
           <a:xfrm>
-            <a:off x="30998160" y="30510487"/>
-            <a:ext cx="9875520" cy="1752600"/>
+            <a:off x="30998160" y="40680650"/>
+            <a:ext cx="9875520" cy="2336800"/>
           </a:xfrm>
           <a:prstGeom prst="rect">
             <a:avLst/>
@@ -2664,23 +2664,23 @@
     </p:spTree>
     <p:extLst>
       <p:ext uri="{BB962C8B-B14F-4D97-AF65-F5344CB8AC3E}">
-        <p14:creationId xmlns:p14="http://schemas.microsoft.com/office/powerpoint/2010/main" val="4132853106"/>
+        <p14:creationId xmlns:p14="http://schemas.microsoft.com/office/powerpoint/2010/main" val="3719697155"/>
       </p:ext>
     </p:extLst>
   </p:cSld>
   <p:clrMap bg1="lt1" tx1="dk1" bg2="lt2" tx2="dk2" accent1="accent1" accent2="accent2" accent3="accent3" accent4="accent4" accent5="accent5" accent6="accent6" hlink="hlink" folHlink="folHlink"/>
   <p:sldLayoutIdLst>
-    <p:sldLayoutId id="2147483685" r:id="rId1"/>
-    <p:sldLayoutId id="2147483686" r:id="rId2"/>
-    <p:sldLayoutId id="2147483687" r:id="rId3"/>
-    <p:sldLayoutId id="2147483688" r:id="rId4"/>
-    <p:sldLayoutId id="2147483689" r:id="rId5"/>
-    <p:sldLayoutId id="2147483690" r:id="rId6"/>
-    <p:sldLayoutId id="2147483691" r:id="rId7"/>
-    <p:sldLayoutId id="2147483692" r:id="rId8"/>
-    <p:sldLayoutId id="2147483693" r:id="rId9"/>
-    <p:sldLayoutId id="2147483694" r:id="rId10"/>
-    <p:sldLayoutId id="2147483695" r:id="rId11"/>
+    <p:sldLayoutId id="2147483697" r:id="rId1"/>
+    <p:sldLayoutId id="2147483698" r:id="rId2"/>
+    <p:sldLayoutId id="2147483699" r:id="rId3"/>
+    <p:sldLayoutId id="2147483700" r:id="rId4"/>
+    <p:sldLayoutId id="2147483701" r:id="rId5"/>
+    <p:sldLayoutId id="2147483702" r:id="rId6"/>
+    <p:sldLayoutId id="2147483703" r:id="rId7"/>
+    <p:sldLayoutId id="2147483704" r:id="rId8"/>
+    <p:sldLayoutId id="2147483705" r:id="rId9"/>
+    <p:sldLayoutId id="2147483706" r:id="rId10"/>
+    <p:sldLayoutId id="2147483707" r:id="rId11"/>
   </p:sldLayoutIdLst>
   <p:txStyles>
     <p:titleStyle>

</xml_diff>

<commit_message>
changed otolith poster column header "rules" to "collection rules" and edited width of ppts to 42 in
</commit_message>
<xml_diff>
--- a/code/template_landscape.pptx
+++ b/code/template_landscape.pptx
@@ -2,12 +2,12 @@
 <file path=ppt/presentation.xml><?xml version="1.0" encoding="utf-8"?>
 <p:presentation xmlns:a="http://schemas.openxmlformats.org/drawingml/2006/main" xmlns:r="http://schemas.openxmlformats.org/officeDocument/2006/relationships" xmlns:p="http://schemas.openxmlformats.org/presentationml/2006/main" saveSubsetFonts="1">
   <p:sldMasterIdLst>
-    <p:sldMasterId id="2147483696" r:id="rId1"/>
+    <p:sldMasterId id="2147483708" r:id="rId1"/>
   </p:sldMasterIdLst>
   <p:sldIdLst>
     <p:sldId id="256" r:id="rId2"/>
   </p:sldIdLst>
-  <p:sldSz cx="43891200" cy="43891200"/>
+  <p:sldSz cx="38404800" cy="45720000"/>
   <p:notesSz cx="6858000" cy="9144000"/>
   <p:defaultTextStyle>
     <a:defPPr>
@@ -107,12 +107,12 @@
   <p:extLst>
     <p:ext uri="{EFAFB233-063F-42B5-8137-9DF3F51BA10A}">
       <p15:sldGuideLst xmlns:p15="http://schemas.microsoft.com/office/powerpoint/2012/main">
-        <p15:guide id="1" orient="horz" pos="13824" userDrawn="1">
+        <p15:guide id="1" orient="horz" pos="14400" userDrawn="1">
           <p15:clr>
             <a:srgbClr val="A4A3A4"/>
           </p15:clr>
         </p15:guide>
-        <p15:guide id="2" pos="13824" userDrawn="1">
+        <p15:guide id="2" pos="12096" userDrawn="1">
           <p15:clr>
             <a:srgbClr val="A4A3A4"/>
           </p15:clr>
@@ -152,15 +152,15 @@
         </p:nvSpPr>
         <p:spPr>
           <a:xfrm>
-            <a:off x="3291840" y="7183123"/>
-            <a:ext cx="37307520" cy="15280640"/>
+            <a:off x="2880360" y="7482420"/>
+            <a:ext cx="32644080" cy="15917333"/>
           </a:xfrm>
         </p:spPr>
         <p:txBody>
           <a:bodyPr anchor="b"/>
           <a:lstStyle>
             <a:lvl1pPr algn="ctr">
-              <a:defRPr sz="28800"/>
+              <a:defRPr sz="25200"/>
             </a:lvl1pPr>
           </a:lstStyle>
           <a:p>
@@ -184,8 +184,8 @@
         </p:nvSpPr>
         <p:spPr>
           <a:xfrm>
-            <a:off x="5486400" y="23053043"/>
-            <a:ext cx="32918400" cy="10596877"/>
+            <a:off x="4800600" y="24013587"/>
+            <a:ext cx="28803600" cy="11038413"/>
           </a:xfrm>
         </p:spPr>
         <p:txBody>
@@ -193,39 +193,39 @@
           <a:lstStyle>
             <a:lvl1pPr marL="0" indent="0" algn="ctr">
               <a:buNone/>
-              <a:defRPr sz="11520"/>
+              <a:defRPr sz="10080"/>
             </a:lvl1pPr>
-            <a:lvl2pPr marL="2194560" indent="0" algn="ctr">
-              <a:buNone/>
-              <a:defRPr sz="9600"/>
+            <a:lvl2pPr marL="1920240" indent="0" algn="ctr">
+              <a:buNone/>
+              <a:defRPr sz="8400"/>
             </a:lvl2pPr>
-            <a:lvl3pPr marL="4389120" indent="0" algn="ctr">
-              <a:buNone/>
-              <a:defRPr sz="8640"/>
+            <a:lvl3pPr marL="3840480" indent="0" algn="ctr">
+              <a:buNone/>
+              <a:defRPr sz="7560"/>
             </a:lvl3pPr>
-            <a:lvl4pPr marL="6583680" indent="0" algn="ctr">
-              <a:buNone/>
-              <a:defRPr sz="7680"/>
+            <a:lvl4pPr marL="5760720" indent="0" algn="ctr">
+              <a:buNone/>
+              <a:defRPr sz="6720"/>
             </a:lvl4pPr>
-            <a:lvl5pPr marL="8778240" indent="0" algn="ctr">
-              <a:buNone/>
-              <a:defRPr sz="7680"/>
+            <a:lvl5pPr marL="7680960" indent="0" algn="ctr">
+              <a:buNone/>
+              <a:defRPr sz="6720"/>
             </a:lvl5pPr>
-            <a:lvl6pPr marL="10972800" indent="0" algn="ctr">
-              <a:buNone/>
-              <a:defRPr sz="7680"/>
+            <a:lvl6pPr marL="9601200" indent="0" algn="ctr">
+              <a:buNone/>
+              <a:defRPr sz="6720"/>
             </a:lvl6pPr>
-            <a:lvl7pPr marL="13167360" indent="0" algn="ctr">
-              <a:buNone/>
-              <a:defRPr sz="7680"/>
+            <a:lvl7pPr marL="11521440" indent="0" algn="ctr">
+              <a:buNone/>
+              <a:defRPr sz="6720"/>
             </a:lvl7pPr>
-            <a:lvl8pPr marL="15361920" indent="0" algn="ctr">
-              <a:buNone/>
-              <a:defRPr sz="7680"/>
+            <a:lvl8pPr marL="13441680" indent="0" algn="ctr">
+              <a:buNone/>
+              <a:defRPr sz="6720"/>
             </a:lvl8pPr>
-            <a:lvl9pPr marL="17556480" indent="0" algn="ctr">
-              <a:buNone/>
-              <a:defRPr sz="7680"/>
+            <a:lvl9pPr marL="15361920" indent="0" algn="ctr">
+              <a:buNone/>
+              <a:defRPr sz="6720"/>
             </a:lvl9pPr>
           </a:lstStyle>
           <a:p>
@@ -254,7 +254,7 @@
           <a:p>
             <a:fld id="{A7146EFB-3959-4CE9-B210-335163EB0542}" type="datetimeFigureOut">
               <a:rPr lang="en-US" smtClean="0"/>
-              <a:t>4/1/2023</a:t>
+              <a:t>4/19/2023</a:t>
             </a:fld>
             <a:endParaRPr lang="en-US"/>
           </a:p>
@@ -305,7 +305,7 @@
     </p:spTree>
     <p:extLst>
       <p:ext uri="{BB962C8B-B14F-4D97-AF65-F5344CB8AC3E}">
-        <p14:creationId xmlns:p14="http://schemas.microsoft.com/office/powerpoint/2010/main" val="563405703"/>
+        <p14:creationId xmlns:p14="http://schemas.microsoft.com/office/powerpoint/2010/main" val="3565068513"/>
       </p:ext>
     </p:extLst>
   </p:cSld>
@@ -424,7 +424,7 @@
           <a:p>
             <a:fld id="{A7146EFB-3959-4CE9-B210-335163EB0542}" type="datetimeFigureOut">
               <a:rPr lang="en-US" smtClean="0"/>
-              <a:t>4/1/2023</a:t>
+              <a:t>4/19/2023</a:t>
             </a:fld>
             <a:endParaRPr lang="en-US"/>
           </a:p>
@@ -475,7 +475,7 @@
     </p:spTree>
     <p:extLst>
       <p:ext uri="{BB962C8B-B14F-4D97-AF65-F5344CB8AC3E}">
-        <p14:creationId xmlns:p14="http://schemas.microsoft.com/office/powerpoint/2010/main" val="4161473797"/>
+        <p14:creationId xmlns:p14="http://schemas.microsoft.com/office/powerpoint/2010/main" val="2608081091"/>
       </p:ext>
     </p:extLst>
   </p:cSld>
@@ -514,8 +514,8 @@
         </p:nvSpPr>
         <p:spPr>
           <a:xfrm>
-            <a:off x="31409642" y="2336800"/>
-            <a:ext cx="9464040" cy="37195763"/>
+            <a:off x="27483437" y="2434167"/>
+            <a:ext cx="8281035" cy="38745587"/>
           </a:xfrm>
         </p:spPr>
         <p:txBody>
@@ -542,8 +542,8 @@
         </p:nvSpPr>
         <p:spPr>
           <a:xfrm>
-            <a:off x="3017522" y="2336800"/>
-            <a:ext cx="27843480" cy="37195763"/>
+            <a:off x="2640332" y="2434167"/>
+            <a:ext cx="24363045" cy="38745587"/>
           </a:xfrm>
         </p:spPr>
         <p:txBody>
@@ -604,7 +604,7 @@
           <a:p>
             <a:fld id="{A7146EFB-3959-4CE9-B210-335163EB0542}" type="datetimeFigureOut">
               <a:rPr lang="en-US" smtClean="0"/>
-              <a:t>4/1/2023</a:t>
+              <a:t>4/19/2023</a:t>
             </a:fld>
             <a:endParaRPr lang="en-US"/>
           </a:p>
@@ -655,7 +655,7 @@
     </p:spTree>
     <p:extLst>
       <p:ext uri="{BB962C8B-B14F-4D97-AF65-F5344CB8AC3E}">
-        <p14:creationId xmlns:p14="http://schemas.microsoft.com/office/powerpoint/2010/main" val="1688398348"/>
+        <p14:creationId xmlns:p14="http://schemas.microsoft.com/office/powerpoint/2010/main" val="3005500661"/>
       </p:ext>
     </p:extLst>
   </p:cSld>
@@ -774,7 +774,7 @@
           <a:p>
             <a:fld id="{A7146EFB-3959-4CE9-B210-335163EB0542}" type="datetimeFigureOut">
               <a:rPr lang="en-US" smtClean="0"/>
-              <a:t>4/1/2023</a:t>
+              <a:t>4/19/2023</a:t>
             </a:fld>
             <a:endParaRPr lang="en-US"/>
           </a:p>
@@ -825,7 +825,7 @@
     </p:spTree>
     <p:extLst>
       <p:ext uri="{BB962C8B-B14F-4D97-AF65-F5344CB8AC3E}">
-        <p14:creationId xmlns:p14="http://schemas.microsoft.com/office/powerpoint/2010/main" val="2213424283"/>
+        <p14:creationId xmlns:p14="http://schemas.microsoft.com/office/powerpoint/2010/main" val="2033146415"/>
       </p:ext>
     </p:extLst>
   </p:cSld>
@@ -864,15 +864,15 @@
         </p:nvSpPr>
         <p:spPr>
           <a:xfrm>
-            <a:off x="2994662" y="10942333"/>
-            <a:ext cx="37856160" cy="18257517"/>
+            <a:off x="2620330" y="11398263"/>
+            <a:ext cx="33124140" cy="19018247"/>
           </a:xfrm>
         </p:spPr>
         <p:txBody>
           <a:bodyPr anchor="b"/>
           <a:lstStyle>
             <a:lvl1pPr>
-              <a:defRPr sz="28800"/>
+              <a:defRPr sz="25200"/>
             </a:lvl1pPr>
           </a:lstStyle>
           <a:p>
@@ -896,8 +896,8 @@
         </p:nvSpPr>
         <p:spPr>
           <a:xfrm>
-            <a:off x="2994662" y="29372573"/>
-            <a:ext cx="37856160" cy="9601197"/>
+            <a:off x="2620330" y="30596430"/>
+            <a:ext cx="33124140" cy="10001247"/>
           </a:xfrm>
         </p:spPr>
         <p:txBody>
@@ -905,15 +905,15 @@
           <a:lstStyle>
             <a:lvl1pPr marL="0" indent="0">
               <a:buNone/>
-              <a:defRPr sz="11520">
+              <a:defRPr sz="10080">
                 <a:solidFill>
                   <a:schemeClr val="tx1"/>
                 </a:solidFill>
               </a:defRPr>
             </a:lvl1pPr>
-            <a:lvl2pPr marL="2194560" indent="0">
-              <a:buNone/>
-              <a:defRPr sz="9600">
+            <a:lvl2pPr marL="1920240" indent="0">
+              <a:buNone/>
+              <a:defRPr sz="8400">
                 <a:solidFill>
                   <a:schemeClr val="tx1">
                     <a:tint val="75000"/>
@@ -921,9 +921,9 @@
                 </a:solidFill>
               </a:defRPr>
             </a:lvl2pPr>
-            <a:lvl3pPr marL="4389120" indent="0">
-              <a:buNone/>
-              <a:defRPr sz="8640">
+            <a:lvl3pPr marL="3840480" indent="0">
+              <a:buNone/>
+              <a:defRPr sz="7560">
                 <a:solidFill>
                   <a:schemeClr val="tx1">
                     <a:tint val="75000"/>
@@ -931,9 +931,9 @@
                 </a:solidFill>
               </a:defRPr>
             </a:lvl3pPr>
-            <a:lvl4pPr marL="6583680" indent="0">
-              <a:buNone/>
-              <a:defRPr sz="7680">
+            <a:lvl4pPr marL="5760720" indent="0">
+              <a:buNone/>
+              <a:defRPr sz="6720">
                 <a:solidFill>
                   <a:schemeClr val="tx1">
                     <a:tint val="75000"/>
@@ -941,9 +941,9 @@
                 </a:solidFill>
               </a:defRPr>
             </a:lvl4pPr>
-            <a:lvl5pPr marL="8778240" indent="0">
-              <a:buNone/>
-              <a:defRPr sz="7680">
+            <a:lvl5pPr marL="7680960" indent="0">
+              <a:buNone/>
+              <a:defRPr sz="6720">
                 <a:solidFill>
                   <a:schemeClr val="tx1">
                     <a:tint val="75000"/>
@@ -951,9 +951,9 @@
                 </a:solidFill>
               </a:defRPr>
             </a:lvl5pPr>
-            <a:lvl6pPr marL="10972800" indent="0">
-              <a:buNone/>
-              <a:defRPr sz="7680">
+            <a:lvl6pPr marL="9601200" indent="0">
+              <a:buNone/>
+              <a:defRPr sz="6720">
                 <a:solidFill>
                   <a:schemeClr val="tx1">
                     <a:tint val="75000"/>
@@ -961,9 +961,9 @@
                 </a:solidFill>
               </a:defRPr>
             </a:lvl6pPr>
-            <a:lvl7pPr marL="13167360" indent="0">
-              <a:buNone/>
-              <a:defRPr sz="7680">
+            <a:lvl7pPr marL="11521440" indent="0">
+              <a:buNone/>
+              <a:defRPr sz="6720">
                 <a:solidFill>
                   <a:schemeClr val="tx1">
                     <a:tint val="75000"/>
@@ -971,9 +971,9 @@
                 </a:solidFill>
               </a:defRPr>
             </a:lvl7pPr>
-            <a:lvl8pPr marL="15361920" indent="0">
-              <a:buNone/>
-              <a:defRPr sz="7680">
+            <a:lvl8pPr marL="13441680" indent="0">
+              <a:buNone/>
+              <a:defRPr sz="6720">
                 <a:solidFill>
                   <a:schemeClr val="tx1">
                     <a:tint val="75000"/>
@@ -981,9 +981,9 @@
                 </a:solidFill>
               </a:defRPr>
             </a:lvl8pPr>
-            <a:lvl9pPr marL="17556480" indent="0">
-              <a:buNone/>
-              <a:defRPr sz="7680">
+            <a:lvl9pPr marL="15361920" indent="0">
+              <a:buNone/>
+              <a:defRPr sz="6720">
                 <a:solidFill>
                   <a:schemeClr val="tx1">
                     <a:tint val="75000"/>
@@ -1018,7 +1018,7 @@
           <a:p>
             <a:fld id="{A7146EFB-3959-4CE9-B210-335163EB0542}" type="datetimeFigureOut">
               <a:rPr lang="en-US" smtClean="0"/>
-              <a:t>4/1/2023</a:t>
+              <a:t>4/19/2023</a:t>
             </a:fld>
             <a:endParaRPr lang="en-US"/>
           </a:p>
@@ -1069,7 +1069,7 @@
     </p:spTree>
     <p:extLst>
       <p:ext uri="{BB962C8B-B14F-4D97-AF65-F5344CB8AC3E}">
-        <p14:creationId xmlns:p14="http://schemas.microsoft.com/office/powerpoint/2010/main" val="4089248092"/>
+        <p14:creationId xmlns:p14="http://schemas.microsoft.com/office/powerpoint/2010/main" val="3992549065"/>
       </p:ext>
     </p:extLst>
   </p:cSld>
@@ -1131,8 +1131,8 @@
         </p:nvSpPr>
         <p:spPr>
           <a:xfrm>
-            <a:off x="3017520" y="11684000"/>
-            <a:ext cx="18653760" cy="27848563"/>
+            <a:off x="2640330" y="12170833"/>
+            <a:ext cx="16322040" cy="29008920"/>
           </a:xfrm>
         </p:spPr>
         <p:txBody>
@@ -1188,8 +1188,8 @@
         </p:nvSpPr>
         <p:spPr>
           <a:xfrm>
-            <a:off x="22219920" y="11684000"/>
-            <a:ext cx="18653760" cy="27848563"/>
+            <a:off x="19442430" y="12170833"/>
+            <a:ext cx="16322040" cy="29008920"/>
           </a:xfrm>
         </p:spPr>
         <p:txBody>
@@ -1250,7 +1250,7 @@
           <a:p>
             <a:fld id="{A7146EFB-3959-4CE9-B210-335163EB0542}" type="datetimeFigureOut">
               <a:rPr lang="en-US" smtClean="0"/>
-              <a:t>4/1/2023</a:t>
+              <a:t>4/19/2023</a:t>
             </a:fld>
             <a:endParaRPr lang="en-US"/>
           </a:p>
@@ -1301,7 +1301,7 @@
     </p:spTree>
     <p:extLst>
       <p:ext uri="{BB962C8B-B14F-4D97-AF65-F5344CB8AC3E}">
-        <p14:creationId xmlns:p14="http://schemas.microsoft.com/office/powerpoint/2010/main" val="630700763"/>
+        <p14:creationId xmlns:p14="http://schemas.microsoft.com/office/powerpoint/2010/main" val="1860640286"/>
       </p:ext>
     </p:extLst>
   </p:cSld>
@@ -1340,8 +1340,8 @@
         </p:nvSpPr>
         <p:spPr>
           <a:xfrm>
-            <a:off x="3023237" y="2336810"/>
-            <a:ext cx="37856160" cy="8483603"/>
+            <a:off x="2645332" y="2434177"/>
+            <a:ext cx="33124140" cy="8837087"/>
           </a:xfrm>
         </p:spPr>
         <p:txBody>
@@ -1368,8 +1368,8 @@
         </p:nvSpPr>
         <p:spPr>
           <a:xfrm>
-            <a:off x="3023242" y="10759443"/>
-            <a:ext cx="18568032" cy="5273037"/>
+            <a:off x="2645336" y="11207753"/>
+            <a:ext cx="16247028" cy="5492747"/>
           </a:xfrm>
         </p:spPr>
         <p:txBody>
@@ -1377,39 +1377,39 @@
           <a:lstStyle>
             <a:lvl1pPr marL="0" indent="0">
               <a:buNone/>
-              <a:defRPr sz="11520" b="1"/>
+              <a:defRPr sz="10080" b="1"/>
             </a:lvl1pPr>
-            <a:lvl2pPr marL="2194560" indent="0">
-              <a:buNone/>
-              <a:defRPr sz="9600" b="1"/>
+            <a:lvl2pPr marL="1920240" indent="0">
+              <a:buNone/>
+              <a:defRPr sz="8400" b="1"/>
             </a:lvl2pPr>
-            <a:lvl3pPr marL="4389120" indent="0">
-              <a:buNone/>
-              <a:defRPr sz="8640" b="1"/>
+            <a:lvl3pPr marL="3840480" indent="0">
+              <a:buNone/>
+              <a:defRPr sz="7560" b="1"/>
             </a:lvl3pPr>
-            <a:lvl4pPr marL="6583680" indent="0">
-              <a:buNone/>
-              <a:defRPr sz="7680" b="1"/>
+            <a:lvl4pPr marL="5760720" indent="0">
+              <a:buNone/>
+              <a:defRPr sz="6720" b="1"/>
             </a:lvl4pPr>
-            <a:lvl5pPr marL="8778240" indent="0">
-              <a:buNone/>
-              <a:defRPr sz="7680" b="1"/>
+            <a:lvl5pPr marL="7680960" indent="0">
+              <a:buNone/>
+              <a:defRPr sz="6720" b="1"/>
             </a:lvl5pPr>
-            <a:lvl6pPr marL="10972800" indent="0">
-              <a:buNone/>
-              <a:defRPr sz="7680" b="1"/>
+            <a:lvl6pPr marL="9601200" indent="0">
+              <a:buNone/>
+              <a:defRPr sz="6720" b="1"/>
             </a:lvl6pPr>
-            <a:lvl7pPr marL="13167360" indent="0">
-              <a:buNone/>
-              <a:defRPr sz="7680" b="1"/>
+            <a:lvl7pPr marL="11521440" indent="0">
+              <a:buNone/>
+              <a:defRPr sz="6720" b="1"/>
             </a:lvl7pPr>
-            <a:lvl8pPr marL="15361920" indent="0">
-              <a:buNone/>
-              <a:defRPr sz="7680" b="1"/>
+            <a:lvl8pPr marL="13441680" indent="0">
+              <a:buNone/>
+              <a:defRPr sz="6720" b="1"/>
             </a:lvl8pPr>
-            <a:lvl9pPr marL="17556480" indent="0">
-              <a:buNone/>
-              <a:defRPr sz="7680" b="1"/>
+            <a:lvl9pPr marL="15361920" indent="0">
+              <a:buNone/>
+              <a:defRPr sz="6720" b="1"/>
             </a:lvl9pPr>
           </a:lstStyle>
           <a:p>
@@ -1433,8 +1433,8 @@
         </p:nvSpPr>
         <p:spPr>
           <a:xfrm>
-            <a:off x="3023242" y="16032480"/>
-            <a:ext cx="18568032" cy="23581363"/>
+            <a:off x="2645336" y="16700500"/>
+            <a:ext cx="16247028" cy="24563920"/>
           </a:xfrm>
         </p:spPr>
         <p:txBody>
@@ -1490,8 +1490,8 @@
         </p:nvSpPr>
         <p:spPr>
           <a:xfrm>
-            <a:off x="22219922" y="10759443"/>
-            <a:ext cx="18659477" cy="5273037"/>
+            <a:off x="19442432" y="11207753"/>
+            <a:ext cx="16327042" cy="5492747"/>
           </a:xfrm>
         </p:spPr>
         <p:txBody>
@@ -1499,39 +1499,39 @@
           <a:lstStyle>
             <a:lvl1pPr marL="0" indent="0">
               <a:buNone/>
-              <a:defRPr sz="11520" b="1"/>
+              <a:defRPr sz="10080" b="1"/>
             </a:lvl1pPr>
-            <a:lvl2pPr marL="2194560" indent="0">
-              <a:buNone/>
-              <a:defRPr sz="9600" b="1"/>
+            <a:lvl2pPr marL="1920240" indent="0">
+              <a:buNone/>
+              <a:defRPr sz="8400" b="1"/>
             </a:lvl2pPr>
-            <a:lvl3pPr marL="4389120" indent="0">
-              <a:buNone/>
-              <a:defRPr sz="8640" b="1"/>
+            <a:lvl3pPr marL="3840480" indent="0">
+              <a:buNone/>
+              <a:defRPr sz="7560" b="1"/>
             </a:lvl3pPr>
-            <a:lvl4pPr marL="6583680" indent="0">
-              <a:buNone/>
-              <a:defRPr sz="7680" b="1"/>
+            <a:lvl4pPr marL="5760720" indent="0">
+              <a:buNone/>
+              <a:defRPr sz="6720" b="1"/>
             </a:lvl4pPr>
-            <a:lvl5pPr marL="8778240" indent="0">
-              <a:buNone/>
-              <a:defRPr sz="7680" b="1"/>
+            <a:lvl5pPr marL="7680960" indent="0">
+              <a:buNone/>
+              <a:defRPr sz="6720" b="1"/>
             </a:lvl5pPr>
-            <a:lvl6pPr marL="10972800" indent="0">
-              <a:buNone/>
-              <a:defRPr sz="7680" b="1"/>
+            <a:lvl6pPr marL="9601200" indent="0">
+              <a:buNone/>
+              <a:defRPr sz="6720" b="1"/>
             </a:lvl6pPr>
-            <a:lvl7pPr marL="13167360" indent="0">
-              <a:buNone/>
-              <a:defRPr sz="7680" b="1"/>
+            <a:lvl7pPr marL="11521440" indent="0">
+              <a:buNone/>
+              <a:defRPr sz="6720" b="1"/>
             </a:lvl7pPr>
-            <a:lvl8pPr marL="15361920" indent="0">
-              <a:buNone/>
-              <a:defRPr sz="7680" b="1"/>
+            <a:lvl8pPr marL="13441680" indent="0">
+              <a:buNone/>
+              <a:defRPr sz="6720" b="1"/>
             </a:lvl8pPr>
-            <a:lvl9pPr marL="17556480" indent="0">
-              <a:buNone/>
-              <a:defRPr sz="7680" b="1"/>
+            <a:lvl9pPr marL="15361920" indent="0">
+              <a:buNone/>
+              <a:defRPr sz="6720" b="1"/>
             </a:lvl9pPr>
           </a:lstStyle>
           <a:p>
@@ -1555,8 +1555,8 @@
         </p:nvSpPr>
         <p:spPr>
           <a:xfrm>
-            <a:off x="22219922" y="16032480"/>
-            <a:ext cx="18659477" cy="23581363"/>
+            <a:off x="19442432" y="16700500"/>
+            <a:ext cx="16327042" cy="24563920"/>
           </a:xfrm>
         </p:spPr>
         <p:txBody>
@@ -1617,7 +1617,7 @@
           <a:p>
             <a:fld id="{A7146EFB-3959-4CE9-B210-335163EB0542}" type="datetimeFigureOut">
               <a:rPr lang="en-US" smtClean="0"/>
-              <a:t>4/1/2023</a:t>
+              <a:t>4/19/2023</a:t>
             </a:fld>
             <a:endParaRPr lang="en-US"/>
           </a:p>
@@ -1668,7 +1668,7 @@
     </p:spTree>
     <p:extLst>
       <p:ext uri="{BB962C8B-B14F-4D97-AF65-F5344CB8AC3E}">
-        <p14:creationId xmlns:p14="http://schemas.microsoft.com/office/powerpoint/2010/main" val="3774574505"/>
+        <p14:creationId xmlns:p14="http://schemas.microsoft.com/office/powerpoint/2010/main" val="2224164882"/>
       </p:ext>
     </p:extLst>
   </p:cSld>
@@ -1735,7 +1735,7 @@
           <a:p>
             <a:fld id="{A7146EFB-3959-4CE9-B210-335163EB0542}" type="datetimeFigureOut">
               <a:rPr lang="en-US" smtClean="0"/>
-              <a:t>4/1/2023</a:t>
+              <a:t>4/19/2023</a:t>
             </a:fld>
             <a:endParaRPr lang="en-US"/>
           </a:p>
@@ -1786,7 +1786,7 @@
     </p:spTree>
     <p:extLst>
       <p:ext uri="{BB962C8B-B14F-4D97-AF65-F5344CB8AC3E}">
-        <p14:creationId xmlns:p14="http://schemas.microsoft.com/office/powerpoint/2010/main" val="2542565760"/>
+        <p14:creationId xmlns:p14="http://schemas.microsoft.com/office/powerpoint/2010/main" val="1295679078"/>
       </p:ext>
     </p:extLst>
   </p:cSld>
@@ -1830,7 +1830,7 @@
           <a:p>
             <a:fld id="{A7146EFB-3959-4CE9-B210-335163EB0542}" type="datetimeFigureOut">
               <a:rPr lang="en-US" smtClean="0"/>
-              <a:t>4/1/2023</a:t>
+              <a:t>4/19/2023</a:t>
             </a:fld>
             <a:endParaRPr lang="en-US"/>
           </a:p>
@@ -1881,7 +1881,7 @@
     </p:spTree>
     <p:extLst>
       <p:ext uri="{BB962C8B-B14F-4D97-AF65-F5344CB8AC3E}">
-        <p14:creationId xmlns:p14="http://schemas.microsoft.com/office/powerpoint/2010/main" val="3359046726"/>
+        <p14:creationId xmlns:p14="http://schemas.microsoft.com/office/powerpoint/2010/main" val="455105588"/>
       </p:ext>
     </p:extLst>
   </p:cSld>
@@ -1920,15 +1920,15 @@
         </p:nvSpPr>
         <p:spPr>
           <a:xfrm>
-            <a:off x="3023237" y="2926080"/>
-            <a:ext cx="14156054" cy="10241280"/>
+            <a:off x="2645332" y="3048000"/>
+            <a:ext cx="12386548" cy="10668000"/>
           </a:xfrm>
         </p:spPr>
         <p:txBody>
           <a:bodyPr anchor="b"/>
           <a:lstStyle>
             <a:lvl1pPr>
-              <a:defRPr sz="15360"/>
+              <a:defRPr sz="13440"/>
             </a:lvl1pPr>
           </a:lstStyle>
           <a:p>
@@ -1952,39 +1952,39 @@
         </p:nvSpPr>
         <p:spPr>
           <a:xfrm>
-            <a:off x="18659477" y="6319530"/>
-            <a:ext cx="22219920" cy="31191200"/>
+            <a:off x="16327042" y="6582844"/>
+            <a:ext cx="19442430" cy="32490833"/>
           </a:xfrm>
         </p:spPr>
         <p:txBody>
           <a:bodyPr/>
           <a:lstStyle>
             <a:lvl1pPr>
-              <a:defRPr sz="15360"/>
+              <a:defRPr sz="13440"/>
             </a:lvl1pPr>
             <a:lvl2pPr>
-              <a:defRPr sz="13440"/>
+              <a:defRPr sz="11760"/>
             </a:lvl2pPr>
             <a:lvl3pPr>
-              <a:defRPr sz="11520"/>
+              <a:defRPr sz="10080"/>
             </a:lvl3pPr>
             <a:lvl4pPr>
-              <a:defRPr sz="9600"/>
+              <a:defRPr sz="8400"/>
             </a:lvl4pPr>
             <a:lvl5pPr>
-              <a:defRPr sz="9600"/>
+              <a:defRPr sz="8400"/>
             </a:lvl5pPr>
             <a:lvl6pPr>
-              <a:defRPr sz="9600"/>
+              <a:defRPr sz="8400"/>
             </a:lvl6pPr>
             <a:lvl7pPr>
-              <a:defRPr sz="9600"/>
+              <a:defRPr sz="8400"/>
             </a:lvl7pPr>
             <a:lvl8pPr>
-              <a:defRPr sz="9600"/>
+              <a:defRPr sz="8400"/>
             </a:lvl8pPr>
             <a:lvl9pPr>
-              <a:defRPr sz="9600"/>
+              <a:defRPr sz="8400"/>
             </a:lvl9pPr>
           </a:lstStyle>
           <a:p>
@@ -2037,8 +2037,8 @@
         </p:nvSpPr>
         <p:spPr>
           <a:xfrm>
-            <a:off x="3023237" y="13167360"/>
-            <a:ext cx="14156054" cy="24394163"/>
+            <a:off x="2645332" y="13716000"/>
+            <a:ext cx="12386548" cy="25410587"/>
           </a:xfrm>
         </p:spPr>
         <p:txBody>
@@ -2046,39 +2046,39 @@
           <a:lstStyle>
             <a:lvl1pPr marL="0" indent="0">
               <a:buNone/>
-              <a:defRPr sz="7680"/>
+              <a:defRPr sz="6720"/>
             </a:lvl1pPr>
-            <a:lvl2pPr marL="2194560" indent="0">
-              <a:buNone/>
-              <a:defRPr sz="6720"/>
+            <a:lvl2pPr marL="1920240" indent="0">
+              <a:buNone/>
+              <a:defRPr sz="5880"/>
             </a:lvl2pPr>
-            <a:lvl3pPr marL="4389120" indent="0">
-              <a:buNone/>
-              <a:defRPr sz="5760"/>
+            <a:lvl3pPr marL="3840480" indent="0">
+              <a:buNone/>
+              <a:defRPr sz="5040"/>
             </a:lvl3pPr>
-            <a:lvl4pPr marL="6583680" indent="0">
-              <a:buNone/>
-              <a:defRPr sz="4800"/>
+            <a:lvl4pPr marL="5760720" indent="0">
+              <a:buNone/>
+              <a:defRPr sz="4200"/>
             </a:lvl4pPr>
-            <a:lvl5pPr marL="8778240" indent="0">
-              <a:buNone/>
-              <a:defRPr sz="4800"/>
+            <a:lvl5pPr marL="7680960" indent="0">
+              <a:buNone/>
+              <a:defRPr sz="4200"/>
             </a:lvl5pPr>
-            <a:lvl6pPr marL="10972800" indent="0">
-              <a:buNone/>
-              <a:defRPr sz="4800"/>
+            <a:lvl6pPr marL="9601200" indent="0">
+              <a:buNone/>
+              <a:defRPr sz="4200"/>
             </a:lvl6pPr>
-            <a:lvl7pPr marL="13167360" indent="0">
-              <a:buNone/>
-              <a:defRPr sz="4800"/>
+            <a:lvl7pPr marL="11521440" indent="0">
+              <a:buNone/>
+              <a:defRPr sz="4200"/>
             </a:lvl7pPr>
-            <a:lvl8pPr marL="15361920" indent="0">
-              <a:buNone/>
-              <a:defRPr sz="4800"/>
+            <a:lvl8pPr marL="13441680" indent="0">
+              <a:buNone/>
+              <a:defRPr sz="4200"/>
             </a:lvl8pPr>
-            <a:lvl9pPr marL="17556480" indent="0">
-              <a:buNone/>
-              <a:defRPr sz="4800"/>
+            <a:lvl9pPr marL="15361920" indent="0">
+              <a:buNone/>
+              <a:defRPr sz="4200"/>
             </a:lvl9pPr>
           </a:lstStyle>
           <a:p>
@@ -2107,7 +2107,7 @@
           <a:p>
             <a:fld id="{A7146EFB-3959-4CE9-B210-335163EB0542}" type="datetimeFigureOut">
               <a:rPr lang="en-US" smtClean="0"/>
-              <a:t>4/1/2023</a:t>
+              <a:t>4/19/2023</a:t>
             </a:fld>
             <a:endParaRPr lang="en-US"/>
           </a:p>
@@ -2158,7 +2158,7 @@
     </p:spTree>
     <p:extLst>
       <p:ext uri="{BB962C8B-B14F-4D97-AF65-F5344CB8AC3E}">
-        <p14:creationId xmlns:p14="http://schemas.microsoft.com/office/powerpoint/2010/main" val="2980171071"/>
+        <p14:creationId xmlns:p14="http://schemas.microsoft.com/office/powerpoint/2010/main" val="165402379"/>
       </p:ext>
     </p:extLst>
   </p:cSld>
@@ -2197,15 +2197,15 @@
         </p:nvSpPr>
         <p:spPr>
           <a:xfrm>
-            <a:off x="3023237" y="2926080"/>
-            <a:ext cx="14156054" cy="10241280"/>
+            <a:off x="2645332" y="3048000"/>
+            <a:ext cx="12386548" cy="10668000"/>
           </a:xfrm>
         </p:spPr>
         <p:txBody>
           <a:bodyPr anchor="b"/>
           <a:lstStyle>
             <a:lvl1pPr>
-              <a:defRPr sz="15360"/>
+              <a:defRPr sz="13440"/>
             </a:lvl1pPr>
           </a:lstStyle>
           <a:p>
@@ -2229,8 +2229,8 @@
         </p:nvSpPr>
         <p:spPr>
           <a:xfrm>
-            <a:off x="18659477" y="6319530"/>
-            <a:ext cx="22219920" cy="31191200"/>
+            <a:off x="16327042" y="6582844"/>
+            <a:ext cx="19442430" cy="32490833"/>
           </a:xfrm>
         </p:spPr>
         <p:txBody>
@@ -2238,39 +2238,39 @@
           <a:lstStyle>
             <a:lvl1pPr marL="0" indent="0">
               <a:buNone/>
-              <a:defRPr sz="15360"/>
+              <a:defRPr sz="13440"/>
             </a:lvl1pPr>
-            <a:lvl2pPr marL="2194560" indent="0">
-              <a:buNone/>
-              <a:defRPr sz="13440"/>
+            <a:lvl2pPr marL="1920240" indent="0">
+              <a:buNone/>
+              <a:defRPr sz="11760"/>
             </a:lvl2pPr>
-            <a:lvl3pPr marL="4389120" indent="0">
-              <a:buNone/>
-              <a:defRPr sz="11520"/>
+            <a:lvl3pPr marL="3840480" indent="0">
+              <a:buNone/>
+              <a:defRPr sz="10080"/>
             </a:lvl3pPr>
-            <a:lvl4pPr marL="6583680" indent="0">
-              <a:buNone/>
-              <a:defRPr sz="9600"/>
+            <a:lvl4pPr marL="5760720" indent="0">
+              <a:buNone/>
+              <a:defRPr sz="8400"/>
             </a:lvl4pPr>
-            <a:lvl5pPr marL="8778240" indent="0">
-              <a:buNone/>
-              <a:defRPr sz="9600"/>
+            <a:lvl5pPr marL="7680960" indent="0">
+              <a:buNone/>
+              <a:defRPr sz="8400"/>
             </a:lvl5pPr>
-            <a:lvl6pPr marL="10972800" indent="0">
-              <a:buNone/>
-              <a:defRPr sz="9600"/>
+            <a:lvl6pPr marL="9601200" indent="0">
+              <a:buNone/>
+              <a:defRPr sz="8400"/>
             </a:lvl6pPr>
-            <a:lvl7pPr marL="13167360" indent="0">
-              <a:buNone/>
-              <a:defRPr sz="9600"/>
+            <a:lvl7pPr marL="11521440" indent="0">
+              <a:buNone/>
+              <a:defRPr sz="8400"/>
             </a:lvl7pPr>
-            <a:lvl8pPr marL="15361920" indent="0">
-              <a:buNone/>
-              <a:defRPr sz="9600"/>
+            <a:lvl8pPr marL="13441680" indent="0">
+              <a:buNone/>
+              <a:defRPr sz="8400"/>
             </a:lvl8pPr>
-            <a:lvl9pPr marL="17556480" indent="0">
-              <a:buNone/>
-              <a:defRPr sz="9600"/>
+            <a:lvl9pPr marL="15361920" indent="0">
+              <a:buNone/>
+              <a:defRPr sz="8400"/>
             </a:lvl9pPr>
           </a:lstStyle>
           <a:p>
@@ -2294,8 +2294,8 @@
         </p:nvSpPr>
         <p:spPr>
           <a:xfrm>
-            <a:off x="3023237" y="13167360"/>
-            <a:ext cx="14156054" cy="24394163"/>
+            <a:off x="2645332" y="13716000"/>
+            <a:ext cx="12386548" cy="25410587"/>
           </a:xfrm>
         </p:spPr>
         <p:txBody>
@@ -2303,39 +2303,39 @@
           <a:lstStyle>
             <a:lvl1pPr marL="0" indent="0">
               <a:buNone/>
-              <a:defRPr sz="7680"/>
+              <a:defRPr sz="6720"/>
             </a:lvl1pPr>
-            <a:lvl2pPr marL="2194560" indent="0">
-              <a:buNone/>
-              <a:defRPr sz="6720"/>
+            <a:lvl2pPr marL="1920240" indent="0">
+              <a:buNone/>
+              <a:defRPr sz="5880"/>
             </a:lvl2pPr>
-            <a:lvl3pPr marL="4389120" indent="0">
-              <a:buNone/>
-              <a:defRPr sz="5760"/>
+            <a:lvl3pPr marL="3840480" indent="0">
+              <a:buNone/>
+              <a:defRPr sz="5040"/>
             </a:lvl3pPr>
-            <a:lvl4pPr marL="6583680" indent="0">
-              <a:buNone/>
-              <a:defRPr sz="4800"/>
+            <a:lvl4pPr marL="5760720" indent="0">
+              <a:buNone/>
+              <a:defRPr sz="4200"/>
             </a:lvl4pPr>
-            <a:lvl5pPr marL="8778240" indent="0">
-              <a:buNone/>
-              <a:defRPr sz="4800"/>
+            <a:lvl5pPr marL="7680960" indent="0">
+              <a:buNone/>
+              <a:defRPr sz="4200"/>
             </a:lvl5pPr>
-            <a:lvl6pPr marL="10972800" indent="0">
-              <a:buNone/>
-              <a:defRPr sz="4800"/>
+            <a:lvl6pPr marL="9601200" indent="0">
+              <a:buNone/>
+              <a:defRPr sz="4200"/>
             </a:lvl6pPr>
-            <a:lvl7pPr marL="13167360" indent="0">
-              <a:buNone/>
-              <a:defRPr sz="4800"/>
+            <a:lvl7pPr marL="11521440" indent="0">
+              <a:buNone/>
+              <a:defRPr sz="4200"/>
             </a:lvl7pPr>
-            <a:lvl8pPr marL="15361920" indent="0">
-              <a:buNone/>
-              <a:defRPr sz="4800"/>
+            <a:lvl8pPr marL="13441680" indent="0">
+              <a:buNone/>
+              <a:defRPr sz="4200"/>
             </a:lvl8pPr>
-            <a:lvl9pPr marL="17556480" indent="0">
-              <a:buNone/>
-              <a:defRPr sz="4800"/>
+            <a:lvl9pPr marL="15361920" indent="0">
+              <a:buNone/>
+              <a:defRPr sz="4200"/>
             </a:lvl9pPr>
           </a:lstStyle>
           <a:p>
@@ -2364,7 +2364,7 @@
           <a:p>
             <a:fld id="{A7146EFB-3959-4CE9-B210-335163EB0542}" type="datetimeFigureOut">
               <a:rPr lang="en-US" smtClean="0"/>
-              <a:t>4/1/2023</a:t>
+              <a:t>4/19/2023</a:t>
             </a:fld>
             <a:endParaRPr lang="en-US"/>
           </a:p>
@@ -2415,7 +2415,7 @@
     </p:spTree>
     <p:extLst>
       <p:ext uri="{BB962C8B-B14F-4D97-AF65-F5344CB8AC3E}">
-        <p14:creationId xmlns:p14="http://schemas.microsoft.com/office/powerpoint/2010/main" val="368447483"/>
+        <p14:creationId xmlns:p14="http://schemas.microsoft.com/office/powerpoint/2010/main" val="208604780"/>
       </p:ext>
     </p:extLst>
   </p:cSld>
@@ -2459,8 +2459,8 @@
         </p:nvSpPr>
         <p:spPr>
           <a:xfrm>
-            <a:off x="3017520" y="2336810"/>
-            <a:ext cx="37856160" cy="8483603"/>
+            <a:off x="2640330" y="2434177"/>
+            <a:ext cx="33124140" cy="8837087"/>
           </a:xfrm>
           <a:prstGeom prst="rect">
             <a:avLst/>
@@ -2492,8 +2492,8 @@
         </p:nvSpPr>
         <p:spPr>
           <a:xfrm>
-            <a:off x="3017520" y="11684000"/>
-            <a:ext cx="37856160" cy="27848563"/>
+            <a:off x="2640330" y="12170833"/>
+            <a:ext cx="33124140" cy="29008920"/>
           </a:xfrm>
           <a:prstGeom prst="rect">
             <a:avLst/>
@@ -2554,8 +2554,8 @@
         </p:nvSpPr>
         <p:spPr>
           <a:xfrm>
-            <a:off x="3017520" y="40680650"/>
-            <a:ext cx="9875520" cy="2336800"/>
+            <a:off x="2640330" y="42375677"/>
+            <a:ext cx="8641080" cy="2434167"/>
           </a:xfrm>
           <a:prstGeom prst="rect">
             <a:avLst/>
@@ -2565,7 +2565,7 @@
           <a:bodyPr vert="horz" lIns="91440" tIns="45720" rIns="91440" bIns="45720" rtlCol="0" anchor="ctr"/>
           <a:lstStyle>
             <a:lvl1pPr algn="l">
-              <a:defRPr sz="5760">
+              <a:defRPr sz="5040">
                 <a:solidFill>
                   <a:schemeClr val="tx1">
                     <a:tint val="75000"/>
@@ -2577,7 +2577,7 @@
           <a:p>
             <a:fld id="{A7146EFB-3959-4CE9-B210-335163EB0542}" type="datetimeFigureOut">
               <a:rPr lang="en-US" smtClean="0"/>
-              <a:t>4/1/2023</a:t>
+              <a:t>4/19/2023</a:t>
             </a:fld>
             <a:endParaRPr lang="en-US"/>
           </a:p>
@@ -2595,8 +2595,8 @@
         </p:nvSpPr>
         <p:spPr>
           <a:xfrm>
-            <a:off x="14538960" y="40680650"/>
-            <a:ext cx="14813280" cy="2336800"/>
+            <a:off x="12721590" y="42375677"/>
+            <a:ext cx="12961620" cy="2434167"/>
           </a:xfrm>
           <a:prstGeom prst="rect">
             <a:avLst/>
@@ -2606,7 +2606,7 @@
           <a:bodyPr vert="horz" lIns="91440" tIns="45720" rIns="91440" bIns="45720" rtlCol="0" anchor="ctr"/>
           <a:lstStyle>
             <a:lvl1pPr algn="ctr">
-              <a:defRPr sz="5760">
+              <a:defRPr sz="5040">
                 <a:solidFill>
                   <a:schemeClr val="tx1">
                     <a:tint val="75000"/>
@@ -2632,8 +2632,8 @@
         </p:nvSpPr>
         <p:spPr>
           <a:xfrm>
-            <a:off x="30998160" y="40680650"/>
-            <a:ext cx="9875520" cy="2336800"/>
+            <a:off x="27123390" y="42375677"/>
+            <a:ext cx="8641080" cy="2434167"/>
           </a:xfrm>
           <a:prstGeom prst="rect">
             <a:avLst/>
@@ -2643,7 +2643,7 @@
           <a:bodyPr vert="horz" lIns="91440" tIns="45720" rIns="91440" bIns="45720" rtlCol="0" anchor="ctr"/>
           <a:lstStyle>
             <a:lvl1pPr algn="r">
-              <a:defRPr sz="5760">
+              <a:defRPr sz="5040">
                 <a:solidFill>
                   <a:schemeClr val="tx1">
                     <a:tint val="75000"/>
@@ -2664,27 +2664,27 @@
     </p:spTree>
     <p:extLst>
       <p:ext uri="{BB962C8B-B14F-4D97-AF65-F5344CB8AC3E}">
-        <p14:creationId xmlns:p14="http://schemas.microsoft.com/office/powerpoint/2010/main" val="3719697155"/>
+        <p14:creationId xmlns:p14="http://schemas.microsoft.com/office/powerpoint/2010/main" val="2627329111"/>
       </p:ext>
     </p:extLst>
   </p:cSld>
   <p:clrMap bg1="lt1" tx1="dk1" bg2="lt2" tx2="dk2" accent1="accent1" accent2="accent2" accent3="accent3" accent4="accent4" accent5="accent5" accent6="accent6" hlink="hlink" folHlink="folHlink"/>
   <p:sldLayoutIdLst>
-    <p:sldLayoutId id="2147483697" r:id="rId1"/>
-    <p:sldLayoutId id="2147483698" r:id="rId2"/>
-    <p:sldLayoutId id="2147483699" r:id="rId3"/>
-    <p:sldLayoutId id="2147483700" r:id="rId4"/>
-    <p:sldLayoutId id="2147483701" r:id="rId5"/>
-    <p:sldLayoutId id="2147483702" r:id="rId6"/>
-    <p:sldLayoutId id="2147483703" r:id="rId7"/>
-    <p:sldLayoutId id="2147483704" r:id="rId8"/>
-    <p:sldLayoutId id="2147483705" r:id="rId9"/>
-    <p:sldLayoutId id="2147483706" r:id="rId10"/>
-    <p:sldLayoutId id="2147483707" r:id="rId11"/>
+    <p:sldLayoutId id="2147483709" r:id="rId1"/>
+    <p:sldLayoutId id="2147483710" r:id="rId2"/>
+    <p:sldLayoutId id="2147483711" r:id="rId3"/>
+    <p:sldLayoutId id="2147483712" r:id="rId4"/>
+    <p:sldLayoutId id="2147483713" r:id="rId5"/>
+    <p:sldLayoutId id="2147483714" r:id="rId6"/>
+    <p:sldLayoutId id="2147483715" r:id="rId7"/>
+    <p:sldLayoutId id="2147483716" r:id="rId8"/>
+    <p:sldLayoutId id="2147483717" r:id="rId9"/>
+    <p:sldLayoutId id="2147483718" r:id="rId10"/>
+    <p:sldLayoutId id="2147483719" r:id="rId11"/>
   </p:sldLayoutIdLst>
   <p:txStyles>
     <p:titleStyle>
-      <a:lvl1pPr algn="l" defTabSz="4389120" rtl="0" eaLnBrk="1" latinLnBrk="0" hangingPunct="1">
+      <a:lvl1pPr algn="l" defTabSz="3840480" rtl="0" eaLnBrk="1" latinLnBrk="0" hangingPunct="1">
         <a:lnSpc>
           <a:spcPct val="90000"/>
         </a:lnSpc>
@@ -2692,7 +2692,7 @@
           <a:spcPct val="0"/>
         </a:spcBef>
         <a:buNone/>
-        <a:defRPr sz="21120" kern="1200">
+        <a:defRPr sz="18480" kern="1200">
           <a:solidFill>
             <a:schemeClr val="tx1"/>
           </a:solidFill>
@@ -2703,16 +2703,16 @@
       </a:lvl1pPr>
     </p:titleStyle>
     <p:bodyStyle>
-      <a:lvl1pPr marL="1097280" indent="-1097280" algn="l" defTabSz="4389120" rtl="0" eaLnBrk="1" latinLnBrk="0" hangingPunct="1">
+      <a:lvl1pPr marL="960120" indent="-960120" algn="l" defTabSz="3840480" rtl="0" eaLnBrk="1" latinLnBrk="0" hangingPunct="1">
         <a:lnSpc>
           <a:spcPct val="90000"/>
         </a:lnSpc>
         <a:spcBef>
-          <a:spcPts val="4800"/>
+          <a:spcPts val="4200"/>
         </a:spcBef>
         <a:buFont typeface="Arial" panose="020B0604020202020204" pitchFamily="34" charset="0"/>
         <a:buChar char="•"/>
-        <a:defRPr sz="13440" kern="1200">
+        <a:defRPr sz="11760" kern="1200">
           <a:solidFill>
             <a:schemeClr val="tx1"/>
           </a:solidFill>
@@ -2721,16 +2721,16 @@
           <a:cs typeface="+mn-cs"/>
         </a:defRPr>
       </a:lvl1pPr>
-      <a:lvl2pPr marL="3291840" indent="-1097280" algn="l" defTabSz="4389120" rtl="0" eaLnBrk="1" latinLnBrk="0" hangingPunct="1">
+      <a:lvl2pPr marL="2880360" indent="-960120" algn="l" defTabSz="3840480" rtl="0" eaLnBrk="1" latinLnBrk="0" hangingPunct="1">
         <a:lnSpc>
           <a:spcPct val="90000"/>
         </a:lnSpc>
         <a:spcBef>
-          <a:spcPts val="2400"/>
+          <a:spcPts val="2100"/>
         </a:spcBef>
         <a:buFont typeface="Arial" panose="020B0604020202020204" pitchFamily="34" charset="0"/>
         <a:buChar char="•"/>
-        <a:defRPr sz="11520" kern="1200">
+        <a:defRPr sz="10080" kern="1200">
           <a:solidFill>
             <a:schemeClr val="tx1"/>
           </a:solidFill>
@@ -2739,16 +2739,16 @@
           <a:cs typeface="+mn-cs"/>
         </a:defRPr>
       </a:lvl2pPr>
-      <a:lvl3pPr marL="5486400" indent="-1097280" algn="l" defTabSz="4389120" rtl="0" eaLnBrk="1" latinLnBrk="0" hangingPunct="1">
+      <a:lvl3pPr marL="4800600" indent="-960120" algn="l" defTabSz="3840480" rtl="0" eaLnBrk="1" latinLnBrk="0" hangingPunct="1">
         <a:lnSpc>
           <a:spcPct val="90000"/>
         </a:lnSpc>
         <a:spcBef>
-          <a:spcPts val="2400"/>
+          <a:spcPts val="2100"/>
         </a:spcBef>
         <a:buFont typeface="Arial" panose="020B0604020202020204" pitchFamily="34" charset="0"/>
         <a:buChar char="•"/>
-        <a:defRPr sz="9600" kern="1200">
+        <a:defRPr sz="8400" kern="1200">
           <a:solidFill>
             <a:schemeClr val="tx1"/>
           </a:solidFill>
@@ -2757,16 +2757,16 @@
           <a:cs typeface="+mn-cs"/>
         </a:defRPr>
       </a:lvl3pPr>
-      <a:lvl4pPr marL="7680960" indent="-1097280" algn="l" defTabSz="4389120" rtl="0" eaLnBrk="1" latinLnBrk="0" hangingPunct="1">
+      <a:lvl4pPr marL="6720840" indent="-960120" algn="l" defTabSz="3840480" rtl="0" eaLnBrk="1" latinLnBrk="0" hangingPunct="1">
         <a:lnSpc>
           <a:spcPct val="90000"/>
         </a:lnSpc>
         <a:spcBef>
-          <a:spcPts val="2400"/>
+          <a:spcPts val="2100"/>
         </a:spcBef>
         <a:buFont typeface="Arial" panose="020B0604020202020204" pitchFamily="34" charset="0"/>
         <a:buChar char="•"/>
-        <a:defRPr sz="8640" kern="1200">
+        <a:defRPr sz="7560" kern="1200">
           <a:solidFill>
             <a:schemeClr val="tx1"/>
           </a:solidFill>
@@ -2775,16 +2775,16 @@
           <a:cs typeface="+mn-cs"/>
         </a:defRPr>
       </a:lvl4pPr>
-      <a:lvl5pPr marL="9875520" indent="-1097280" algn="l" defTabSz="4389120" rtl="0" eaLnBrk="1" latinLnBrk="0" hangingPunct="1">
+      <a:lvl5pPr marL="8641080" indent="-960120" algn="l" defTabSz="3840480" rtl="0" eaLnBrk="1" latinLnBrk="0" hangingPunct="1">
         <a:lnSpc>
           <a:spcPct val="90000"/>
         </a:lnSpc>
         <a:spcBef>
-          <a:spcPts val="2400"/>
+          <a:spcPts val="2100"/>
         </a:spcBef>
         <a:buFont typeface="Arial" panose="020B0604020202020204" pitchFamily="34" charset="0"/>
         <a:buChar char="•"/>
-        <a:defRPr sz="8640" kern="1200">
+        <a:defRPr sz="7560" kern="1200">
           <a:solidFill>
             <a:schemeClr val="tx1"/>
           </a:solidFill>
@@ -2793,16 +2793,16 @@
           <a:cs typeface="+mn-cs"/>
         </a:defRPr>
       </a:lvl5pPr>
-      <a:lvl6pPr marL="12070080" indent="-1097280" algn="l" defTabSz="4389120" rtl="0" eaLnBrk="1" latinLnBrk="0" hangingPunct="1">
+      <a:lvl6pPr marL="10561320" indent="-960120" algn="l" defTabSz="3840480" rtl="0" eaLnBrk="1" latinLnBrk="0" hangingPunct="1">
         <a:lnSpc>
           <a:spcPct val="90000"/>
         </a:lnSpc>
         <a:spcBef>
-          <a:spcPts val="2400"/>
+          <a:spcPts val="2100"/>
         </a:spcBef>
         <a:buFont typeface="Arial" panose="020B0604020202020204" pitchFamily="34" charset="0"/>
         <a:buChar char="•"/>
-        <a:defRPr sz="8640" kern="1200">
+        <a:defRPr sz="7560" kern="1200">
           <a:solidFill>
             <a:schemeClr val="tx1"/>
           </a:solidFill>
@@ -2811,16 +2811,16 @@
           <a:cs typeface="+mn-cs"/>
         </a:defRPr>
       </a:lvl6pPr>
-      <a:lvl7pPr marL="14264640" indent="-1097280" algn="l" defTabSz="4389120" rtl="0" eaLnBrk="1" latinLnBrk="0" hangingPunct="1">
+      <a:lvl7pPr marL="12481560" indent="-960120" algn="l" defTabSz="3840480" rtl="0" eaLnBrk="1" latinLnBrk="0" hangingPunct="1">
         <a:lnSpc>
           <a:spcPct val="90000"/>
         </a:lnSpc>
         <a:spcBef>
-          <a:spcPts val="2400"/>
+          <a:spcPts val="2100"/>
         </a:spcBef>
         <a:buFont typeface="Arial" panose="020B0604020202020204" pitchFamily="34" charset="0"/>
         <a:buChar char="•"/>
-        <a:defRPr sz="8640" kern="1200">
+        <a:defRPr sz="7560" kern="1200">
           <a:solidFill>
             <a:schemeClr val="tx1"/>
           </a:solidFill>
@@ -2829,16 +2829,16 @@
           <a:cs typeface="+mn-cs"/>
         </a:defRPr>
       </a:lvl7pPr>
-      <a:lvl8pPr marL="16459200" indent="-1097280" algn="l" defTabSz="4389120" rtl="0" eaLnBrk="1" latinLnBrk="0" hangingPunct="1">
+      <a:lvl8pPr marL="14401800" indent="-960120" algn="l" defTabSz="3840480" rtl="0" eaLnBrk="1" latinLnBrk="0" hangingPunct="1">
         <a:lnSpc>
           <a:spcPct val="90000"/>
         </a:lnSpc>
         <a:spcBef>
-          <a:spcPts val="2400"/>
+          <a:spcPts val="2100"/>
         </a:spcBef>
         <a:buFont typeface="Arial" panose="020B0604020202020204" pitchFamily="34" charset="0"/>
         <a:buChar char="•"/>
-        <a:defRPr sz="8640" kern="1200">
+        <a:defRPr sz="7560" kern="1200">
           <a:solidFill>
             <a:schemeClr val="tx1"/>
           </a:solidFill>
@@ -2847,16 +2847,16 @@
           <a:cs typeface="+mn-cs"/>
         </a:defRPr>
       </a:lvl8pPr>
-      <a:lvl9pPr marL="18653760" indent="-1097280" algn="l" defTabSz="4389120" rtl="0" eaLnBrk="1" latinLnBrk="0" hangingPunct="1">
+      <a:lvl9pPr marL="16322040" indent="-960120" algn="l" defTabSz="3840480" rtl="0" eaLnBrk="1" latinLnBrk="0" hangingPunct="1">
         <a:lnSpc>
           <a:spcPct val="90000"/>
         </a:lnSpc>
         <a:spcBef>
-          <a:spcPts val="2400"/>
+          <a:spcPts val="2100"/>
         </a:spcBef>
         <a:buFont typeface="Arial" panose="020B0604020202020204" pitchFamily="34" charset="0"/>
         <a:buChar char="•"/>
-        <a:defRPr sz="8640" kern="1200">
+        <a:defRPr sz="7560" kern="1200">
           <a:solidFill>
             <a:schemeClr val="tx1"/>
           </a:solidFill>
@@ -2870,8 +2870,8 @@
       <a:defPPr>
         <a:defRPr lang="en-US"/>
       </a:defPPr>
-      <a:lvl1pPr marL="0" algn="l" defTabSz="4389120" rtl="0" eaLnBrk="1" latinLnBrk="0" hangingPunct="1">
-        <a:defRPr sz="8640" kern="1200">
+      <a:lvl1pPr marL="0" algn="l" defTabSz="3840480" rtl="0" eaLnBrk="1" latinLnBrk="0" hangingPunct="1">
+        <a:defRPr sz="7560" kern="1200">
           <a:solidFill>
             <a:schemeClr val="tx1"/>
           </a:solidFill>
@@ -2880,8 +2880,8 @@
           <a:cs typeface="+mn-cs"/>
         </a:defRPr>
       </a:lvl1pPr>
-      <a:lvl2pPr marL="2194560" algn="l" defTabSz="4389120" rtl="0" eaLnBrk="1" latinLnBrk="0" hangingPunct="1">
-        <a:defRPr sz="8640" kern="1200">
+      <a:lvl2pPr marL="1920240" algn="l" defTabSz="3840480" rtl="0" eaLnBrk="1" latinLnBrk="0" hangingPunct="1">
+        <a:defRPr sz="7560" kern="1200">
           <a:solidFill>
             <a:schemeClr val="tx1"/>
           </a:solidFill>
@@ -2890,8 +2890,8 @@
           <a:cs typeface="+mn-cs"/>
         </a:defRPr>
       </a:lvl2pPr>
-      <a:lvl3pPr marL="4389120" algn="l" defTabSz="4389120" rtl="0" eaLnBrk="1" latinLnBrk="0" hangingPunct="1">
-        <a:defRPr sz="8640" kern="1200">
+      <a:lvl3pPr marL="3840480" algn="l" defTabSz="3840480" rtl="0" eaLnBrk="1" latinLnBrk="0" hangingPunct="1">
+        <a:defRPr sz="7560" kern="1200">
           <a:solidFill>
             <a:schemeClr val="tx1"/>
           </a:solidFill>
@@ -2900,8 +2900,8 @@
           <a:cs typeface="+mn-cs"/>
         </a:defRPr>
       </a:lvl3pPr>
-      <a:lvl4pPr marL="6583680" algn="l" defTabSz="4389120" rtl="0" eaLnBrk="1" latinLnBrk="0" hangingPunct="1">
-        <a:defRPr sz="8640" kern="1200">
+      <a:lvl4pPr marL="5760720" algn="l" defTabSz="3840480" rtl="0" eaLnBrk="1" latinLnBrk="0" hangingPunct="1">
+        <a:defRPr sz="7560" kern="1200">
           <a:solidFill>
             <a:schemeClr val="tx1"/>
           </a:solidFill>
@@ -2910,8 +2910,8 @@
           <a:cs typeface="+mn-cs"/>
         </a:defRPr>
       </a:lvl4pPr>
-      <a:lvl5pPr marL="8778240" algn="l" defTabSz="4389120" rtl="0" eaLnBrk="1" latinLnBrk="0" hangingPunct="1">
-        <a:defRPr sz="8640" kern="1200">
+      <a:lvl5pPr marL="7680960" algn="l" defTabSz="3840480" rtl="0" eaLnBrk="1" latinLnBrk="0" hangingPunct="1">
+        <a:defRPr sz="7560" kern="1200">
           <a:solidFill>
             <a:schemeClr val="tx1"/>
           </a:solidFill>
@@ -2920,8 +2920,8 @@
           <a:cs typeface="+mn-cs"/>
         </a:defRPr>
       </a:lvl5pPr>
-      <a:lvl6pPr marL="10972800" algn="l" defTabSz="4389120" rtl="0" eaLnBrk="1" latinLnBrk="0" hangingPunct="1">
-        <a:defRPr sz="8640" kern="1200">
+      <a:lvl6pPr marL="9601200" algn="l" defTabSz="3840480" rtl="0" eaLnBrk="1" latinLnBrk="0" hangingPunct="1">
+        <a:defRPr sz="7560" kern="1200">
           <a:solidFill>
             <a:schemeClr val="tx1"/>
           </a:solidFill>
@@ -2930,8 +2930,8 @@
           <a:cs typeface="+mn-cs"/>
         </a:defRPr>
       </a:lvl6pPr>
-      <a:lvl7pPr marL="13167360" algn="l" defTabSz="4389120" rtl="0" eaLnBrk="1" latinLnBrk="0" hangingPunct="1">
-        <a:defRPr sz="8640" kern="1200">
+      <a:lvl7pPr marL="11521440" algn="l" defTabSz="3840480" rtl="0" eaLnBrk="1" latinLnBrk="0" hangingPunct="1">
+        <a:defRPr sz="7560" kern="1200">
           <a:solidFill>
             <a:schemeClr val="tx1"/>
           </a:solidFill>
@@ -2940,8 +2940,8 @@
           <a:cs typeface="+mn-cs"/>
         </a:defRPr>
       </a:lvl7pPr>
-      <a:lvl8pPr marL="15361920" algn="l" defTabSz="4389120" rtl="0" eaLnBrk="1" latinLnBrk="0" hangingPunct="1">
-        <a:defRPr sz="8640" kern="1200">
+      <a:lvl8pPr marL="13441680" algn="l" defTabSz="3840480" rtl="0" eaLnBrk="1" latinLnBrk="0" hangingPunct="1">
+        <a:defRPr sz="7560" kern="1200">
           <a:solidFill>
             <a:schemeClr val="tx1"/>
           </a:solidFill>
@@ -2950,8 +2950,8 @@
           <a:cs typeface="+mn-cs"/>
         </a:defRPr>
       </a:lvl8pPr>
-      <a:lvl9pPr marL="17556480" algn="l" defTabSz="4389120" rtl="0" eaLnBrk="1" latinLnBrk="0" hangingPunct="1">
-        <a:defRPr sz="8640" kern="1200">
+      <a:lvl9pPr marL="15361920" algn="l" defTabSz="3840480" rtl="0" eaLnBrk="1" latinLnBrk="0" hangingPunct="1">
+        <a:defRPr sz="7560" kern="1200">
           <a:solidFill>
             <a:schemeClr val="tx1"/>
           </a:solidFill>

</xml_diff>